<commit_message>
add new async example
</commit_message>
<xml_diff>
--- a/data/dickinson_basic1.pptx
+++ b/data/dickinson_basic1.pptx
@@ -4260,6 +4260,28 @@
               <a:rPr lang="en-US" sz="2000" dirty="0"/>
               <a:t>Family-owned since 1985</a:t>
             </a:r>
+          </a:p>
+          <a:p>
+            <a:pPr>
+              <a:spcAft>
+                <a:spcPts val="600"/>
+              </a:spcAft>
+              <a:buSzPct val="105000"/>
+              <a:buFont typeface="Arial" pitchFamily="34" charset="0"/>
+              <a:buChar char="•"/>
+            </a:pPr>
+            <a:endParaRPr lang="en-US" sz="2000" dirty="0"/>
+          </a:p>
+          <a:p>
+            <a:pPr>
+              <a:spcAft>
+                <a:spcPts val="600"/>
+              </a:spcAft>
+              <a:buSzPct val="105000"/>
+              <a:buFont typeface="Arial" pitchFamily="34" charset="0"/>
+              <a:buChar char="•"/>
+            </a:pPr>
+            <a:endParaRPr lang="en-US" sz="2000" dirty="0"/>
           </a:p>
           <a:p>
             <a:pPr>
@@ -5255,8 +5277,8 @@
         </p:blipFill>
         <p:spPr>
           <a:xfrm>
-            <a:off x="609600" y="1638300"/>
-            <a:ext cx="7924800" cy="4495800"/>
+            <a:off x="2441825" y="838200"/>
+            <a:ext cx="6248400" cy="4495800"/>
           </a:xfrm>
         </p:spPr>
       </p:pic>
@@ -5297,7 +5319,7 @@
         </p:nvSpPr>
         <p:spPr>
           <a:xfrm>
-            <a:off x="3200400" y="3162517"/>
+            <a:off x="3886200" y="3162517"/>
             <a:ext cx="8229600" cy="532965"/>
           </a:xfrm>
         </p:spPr>
@@ -5309,13 +5331,40 @@
           <a:p>
             <a:pPr algn="l"/>
             <a:r>
+              <a:rPr lang="en-US" sz="1800" b="1" dirty="0">
+                <a:solidFill>
+                  <a:srgbClr val="7F7F7F"/>
+                </a:solidFill>
+                <a:cs typeface="Arial"/>
+              </a:rPr>
+              <a:t>Thank</a:t>
+            </a:r>
+            <a:r>
               <a:rPr lang="en-US" sz="1600" b="1" dirty="0">
                 <a:solidFill>
                   <a:srgbClr val="7F7F7F"/>
                 </a:solidFill>
                 <a:cs typeface="Arial"/>
               </a:rPr>
-              <a:t>Thank you!</a:t>
+              <a:t> </a:t>
+            </a:r>
+            <a:r>
+              <a:rPr lang="en-US" sz="1200" b="1" dirty="0">
+                <a:solidFill>
+                  <a:srgbClr val="7F7F7F"/>
+                </a:solidFill>
+                <a:cs typeface="Arial"/>
+              </a:rPr>
+              <a:t>you</a:t>
+            </a:r>
+            <a:r>
+              <a:rPr lang="en-US" sz="1600" b="1" dirty="0">
+                <a:solidFill>
+                  <a:srgbClr val="7F7F7F"/>
+                </a:solidFill>
+                <a:cs typeface="Arial"/>
+              </a:rPr>
+              <a:t>!</a:t>
             </a:r>
           </a:p>
         </p:txBody>

</xml_diff>

<commit_message>
Added the new dickinson
</commit_message>
<xml_diff>
--- a/data/dickinson_basic1.pptx
+++ b/data/dickinson_basic1.pptx
@@ -4260,6 +4260,28 @@
               <a:rPr lang="en-US" sz="2000" dirty="0"/>
               <a:t>Family-owned since 1985</a:t>
             </a:r>
+          </a:p>
+          <a:p>
+            <a:pPr>
+              <a:spcAft>
+                <a:spcPts val="600"/>
+              </a:spcAft>
+              <a:buSzPct val="105000"/>
+              <a:buFont typeface="Arial" pitchFamily="34" charset="0"/>
+              <a:buChar char="•"/>
+            </a:pPr>
+            <a:endParaRPr lang="en-US" sz="2000" dirty="0"/>
+          </a:p>
+          <a:p>
+            <a:pPr>
+              <a:spcAft>
+                <a:spcPts val="600"/>
+              </a:spcAft>
+              <a:buSzPct val="105000"/>
+              <a:buFont typeface="Arial" pitchFamily="34" charset="0"/>
+              <a:buChar char="•"/>
+            </a:pPr>
+            <a:endParaRPr lang="en-US" sz="2000" dirty="0"/>
           </a:p>
           <a:p>
             <a:pPr>
@@ -5255,8 +5277,8 @@
         </p:blipFill>
         <p:spPr>
           <a:xfrm>
-            <a:off x="609600" y="1638300"/>
-            <a:ext cx="7924800" cy="4495800"/>
+            <a:off x="2441825" y="838200"/>
+            <a:ext cx="6248400" cy="4495800"/>
           </a:xfrm>
         </p:spPr>
       </p:pic>
@@ -5297,7 +5319,7 @@
         </p:nvSpPr>
         <p:spPr>
           <a:xfrm>
-            <a:off x="3200400" y="3162517"/>
+            <a:off x="3886200" y="3162517"/>
             <a:ext cx="8229600" cy="532965"/>
           </a:xfrm>
         </p:spPr>
@@ -5309,13 +5331,40 @@
           <a:p>
             <a:pPr algn="l"/>
             <a:r>
+              <a:rPr lang="en-US" sz="1800" b="1" dirty="0">
+                <a:solidFill>
+                  <a:srgbClr val="7F7F7F"/>
+                </a:solidFill>
+                <a:cs typeface="Arial"/>
+              </a:rPr>
+              <a:t>Thank</a:t>
+            </a:r>
+            <a:r>
               <a:rPr lang="en-US" sz="1600" b="1" dirty="0">
                 <a:solidFill>
                   <a:srgbClr val="7F7F7F"/>
                 </a:solidFill>
                 <a:cs typeface="Arial"/>
               </a:rPr>
-              <a:t>Thank you!</a:t>
+              <a:t> </a:t>
+            </a:r>
+            <a:r>
+              <a:rPr lang="en-US" sz="1200" b="1" dirty="0">
+                <a:solidFill>
+                  <a:srgbClr val="7F7F7F"/>
+                </a:solidFill>
+                <a:cs typeface="Arial"/>
+              </a:rPr>
+              <a:t>you</a:t>
+            </a:r>
+            <a:r>
+              <a:rPr lang="en-US" sz="1600" b="1" dirty="0">
+                <a:solidFill>
+                  <a:srgbClr val="7F7F7F"/>
+                </a:solidFill>
+                <a:cs typeface="Arial"/>
+              </a:rPr>
+              <a:t>!</a:t>
             </a:r>
           </a:p>
         </p:txBody>

</xml_diff>